<commit_message>
lecture 03 was performed
</commit_message>
<xml_diff>
--- a/MSBI.SSIS.Part01/MSBI.SSIS.Part.01.pptx
+++ b/MSBI.SSIS.Part01/MSBI.SSIS.Part.01.pptx
@@ -411,7 +411,7 @@
           <a:p>
             <a:fld id="{7F5E9BF7-95E4-A242-BA1D-05FDCF603BE6}" type="datetime1">
               <a:rPr lang="en-US" smtClean="0"/>
-              <a:t>1/26/2020</a:t>
+              <a:t>1/29/2020</a:t>
             </a:fld>
             <a:endParaRPr lang="en-US"/>
           </a:p>
@@ -577,7 +577,7 @@
           <a:p>
             <a:fld id="{165DBCB1-0306-AD41-9452-11E7C08D5C04}" type="datetime1">
               <a:rPr lang="en-US" smtClean="0"/>
-              <a:t>1/26/2020</a:t>
+              <a:t>1/29/2020</a:t>
             </a:fld>
             <a:endParaRPr lang="en-US"/>
           </a:p>
@@ -18171,18 +18171,18 @@
 </file>
 
 <file path=customXml/item1.xml><?xml version="1.0" encoding="utf-8"?>
-<p:properties xmlns:p="http://schemas.microsoft.com/office/2006/metadata/properties" xmlns:xsi="http://www.w3.org/2001/XMLSchema-instance" xmlns:pc="http://schemas.microsoft.com/office/infopath/2007/PartnerControls">
-  <documentManagement/>
-</p:properties>
-</file>
-
-<file path=customXml/item2.xml><?xml version="1.0" encoding="utf-8"?>
 <?mso-contentType ?>
 <FormTemplates xmlns="http://schemas.microsoft.com/sharepoint/v3/contenttype/forms">
   <Display>DocumentLibraryForm</Display>
   <Edit>DocumentLibraryForm</Edit>
   <New>DocumentLibraryForm</New>
 </FormTemplates>
+</file>
+
+<file path=customXml/item2.xml><?xml version="1.0" encoding="utf-8"?>
+<p:properties xmlns:p="http://schemas.microsoft.com/office/2006/metadata/properties" xmlns:xsi="http://www.w3.org/2001/XMLSchema-instance" xmlns:pc="http://schemas.microsoft.com/office/infopath/2007/PartnerControls">
+  <documentManagement/>
+</p:properties>
 </file>
 
 <file path=customXml/item3.xml><?xml version="1.0" encoding="utf-8"?>
@@ -18318,6 +18318,14 @@
 </file>
 
 <file path=customXml/itemProps1.xml><?xml version="1.0" encoding="utf-8"?>
+<ds:datastoreItem xmlns:ds="http://schemas.openxmlformats.org/officeDocument/2006/customXml" ds:itemID="{14883F0F-DE57-4ECA-B9BB-F22E8C5B5D82}">
+  <ds:schemaRefs>
+    <ds:schemaRef ds:uri="http://schemas.microsoft.com/sharepoint/v3/contenttype/forms"/>
+  </ds:schemaRefs>
+</ds:datastoreItem>
+</file>
+
+<file path=customXml/itemProps2.xml><?xml version="1.0" encoding="utf-8"?>
 <ds:datastoreItem xmlns:ds="http://schemas.openxmlformats.org/officeDocument/2006/customXml" ds:itemID="{D5E3C081-4081-47AD-A9A6-9F18F525DA1D}">
   <ds:schemaRefs>
     <ds:schemaRef ds:uri="http://purl.org/dc/dcmitype/"/>
@@ -18329,14 +18337,6 @@
     <ds:schemaRef ds:uri="http://schemas.microsoft.com/office/infopath/2007/PartnerControls"/>
     <ds:schemaRef ds:uri="http://schemas.openxmlformats.org/package/2006/metadata/core-properties"/>
     <ds:schemaRef ds:uri="http://schemas.microsoft.com/office/2006/metadata/properties"/>
-  </ds:schemaRefs>
-</ds:datastoreItem>
-</file>
-
-<file path=customXml/itemProps2.xml><?xml version="1.0" encoding="utf-8"?>
-<ds:datastoreItem xmlns:ds="http://schemas.openxmlformats.org/officeDocument/2006/customXml" ds:itemID="{14883F0F-DE57-4ECA-B9BB-F22E8C5B5D82}">
-  <ds:schemaRefs>
-    <ds:schemaRef ds:uri="http://schemas.microsoft.com/sharepoint/v3/contenttype/forms"/>
   </ds:schemaRefs>
 </ds:datastoreItem>
 </file>

</xml_diff>